<commit_message>
update ppt and async demo
</commit_message>
<xml_diff>
--- a/ppt/NIO&NETTY初窥.pptx
+++ b/ppt/NIO&NETTY初窥.pptx
@@ -29,8 +29,8 @@
     <p:sldId id="332" r:id="rId22"/>
     <p:sldId id="344" r:id="rId23"/>
     <p:sldId id="345" r:id="rId24"/>
-    <p:sldId id="334" r:id="rId25"/>
-    <p:sldId id="333" r:id="rId26"/>
+    <p:sldId id="333" r:id="rId25"/>
+    <p:sldId id="334" r:id="rId26"/>
     <p:sldId id="261" r:id="rId27"/>
   </p:sldIdLst>
   <p:sldSz cx="12192000" cy="6858000"/>
@@ -1535,6 +1535,10 @@
           <a:bodyPr/>
           <a:lstStyle/>
           <a:p>
+            <a:r>
+              <a:rPr lang="zh-CN" altLang="en-US" dirty="0"/>
+              <a:t>Netty对半包或者粘包的处理其实也很简单。Channel中的数据读取的时候经过解析，如果不是一个完整的数据包，则解析失败，将这个数据包进行保存，等下次解析时再和这个数据包进行组装解析，直到解析到完整的数据包，才会将数据包向下传递</a:t>
+            </a:r>
             <a:endParaRPr lang="zh-CN" altLang="en-US" dirty="0"/>
           </a:p>
         </p:txBody>
@@ -1613,10 +1617,6 @@
           <a:bodyPr/>
           <a:lstStyle/>
           <a:p>
-            <a:r>
-              <a:rPr lang="zh-CN" altLang="en-US" dirty="0"/>
-              <a:t>Netty对半包或者粘包的处理其实也很简单。Channel中的数据读取的时候经过解析，如果不是一个完整的数据包，则解析失败，将这个数据包进行保存，等下次解析时再和这个数据包进行组装解析，直到解析到完整的数据包，才会将数据包向下传递</a:t>
-            </a:r>
             <a:endParaRPr lang="zh-CN" altLang="en-US" dirty="0"/>
           </a:p>
         </p:txBody>
@@ -13426,7 +13426,7 @@
         <p:spPr>
           <a:xfrm>
             <a:off x="292340" y="1462584"/>
-            <a:ext cx="11408367" cy="1476375"/>
+            <a:ext cx="11408367" cy="2584450"/>
           </a:xfrm>
           <a:prstGeom prst="rect">
             <a:avLst/>
@@ -13580,6 +13580,115 @@
               <a:t>）和executor线程池（处理异步任务）</a:t>
             </a:r>
             <a:endParaRPr lang="zh-CN" altLang="en-US" dirty="0" smtClean="0"/>
+          </a:p>
+          <a:p>
+            <a:pPr marL="285750" indent="-285750">
+              <a:buFont typeface="Arial" panose="020B0604020202020204" pitchFamily="34" charset="0"/>
+              <a:buChar char="•"/>
+            </a:pPr>
+            <a:r>
+              <a:rPr lang="zh-CN" altLang="en-US" dirty="0" smtClean="0"/>
+              <a:t>processSelectedKeys方法处理</a:t>
+            </a:r>
+            <a:r>
+              <a:rPr lang="en-US" altLang="zh-CN" dirty="0" smtClean="0"/>
+              <a:t>IO</a:t>
+            </a:r>
+            <a:r>
+              <a:rPr lang="zh-CN" altLang="en-US" dirty="0" smtClean="0"/>
+              <a:t>事件 </a:t>
+            </a:r>
+            <a:r>
+              <a:rPr lang="en-US" altLang="zh-CN" dirty="0" smtClean="0"/>
+              <a:t>/ runAllTasks</a:t>
+            </a:r>
+            <a:r>
+              <a:rPr lang="zh-CN" altLang="en-US" dirty="0" smtClean="0"/>
+              <a:t>方法处理异步任务 （可通过</a:t>
+            </a:r>
+            <a:r>
+              <a:rPr lang="en-US" altLang="zh-CN" dirty="0" smtClean="0"/>
+              <a:t>ioRatio</a:t>
+            </a:r>
+            <a:r>
+              <a:rPr lang="zh-CN" altLang="en-US" dirty="0" smtClean="0"/>
+              <a:t>控制比例</a:t>
+            </a:r>
+            <a:r>
+              <a:rPr lang="zh-CN" altLang="en-US" dirty="0" smtClean="0"/>
+              <a:t>）</a:t>
+            </a:r>
+            <a:endParaRPr lang="zh-CN" altLang="en-US" dirty="0" smtClean="0"/>
+          </a:p>
+          <a:p>
+            <a:pPr marL="285750" indent="-285750">
+              <a:buFont typeface="Arial" panose="020B0604020202020204" pitchFamily="34" charset="0"/>
+              <a:buChar char="•"/>
+            </a:pPr>
+            <a:r>
+              <a:rPr lang="en-US" altLang="zh-CN" dirty="0" smtClean="0"/>
+              <a:t>rebuildSelector</a:t>
+            </a:r>
+            <a:r>
+              <a:rPr lang="zh-CN" altLang="en-US" dirty="0" smtClean="0"/>
+              <a:t>解决</a:t>
+            </a:r>
+            <a:r>
+              <a:rPr lang="en-US" altLang="zh-CN" dirty="0" smtClean="0"/>
+              <a:t>nio</a:t>
+            </a:r>
+            <a:r>
+              <a:rPr lang="zh-CN" altLang="en-US" dirty="0" smtClean="0"/>
+              <a:t>的</a:t>
+            </a:r>
+            <a:r>
+              <a:rPr lang="en-US" altLang="zh-CN" dirty="0" smtClean="0"/>
+              <a:t>select</a:t>
+            </a:r>
+            <a:r>
+              <a:rPr lang="zh-CN" altLang="en-US" dirty="0" smtClean="0"/>
+              <a:t>导致</a:t>
+            </a:r>
+            <a:r>
+              <a:rPr lang="en-US" altLang="zh-CN" dirty="0" smtClean="0"/>
+              <a:t>cpu占用100%的bug</a:t>
+            </a:r>
+            <a:r>
+              <a:rPr lang="zh-CN" altLang="en-US" dirty="0" smtClean="0"/>
+              <a:t>（设置了一个阀值</a:t>
+            </a:r>
+            <a:r>
+              <a:rPr lang="en-US" altLang="zh-CN" dirty="0" smtClean="0"/>
+              <a:t>512</a:t>
+            </a:r>
+            <a:r>
+              <a:rPr lang="zh-CN" altLang="en-US" dirty="0" smtClean="0"/>
+              <a:t>，超过阀值重新注册</a:t>
+            </a:r>
+            <a:r>
+              <a:rPr lang="en-US" altLang="zh-CN" dirty="0" smtClean="0"/>
+              <a:t>selector</a:t>
+            </a:r>
+            <a:r>
+              <a:rPr lang="zh-CN" altLang="en-US" dirty="0" smtClean="0"/>
+              <a:t>）</a:t>
+            </a:r>
+            <a:endParaRPr lang="en-US" altLang="zh-CN" dirty="0" smtClean="0"/>
+          </a:p>
+          <a:p>
+            <a:pPr marL="285750" indent="-285750">
+              <a:buFont typeface="Arial" panose="020B0604020202020204" pitchFamily="34" charset="0"/>
+              <a:buChar char="•"/>
+            </a:pPr>
+            <a:r>
+              <a:rPr lang="zh-CN" altLang="en-US" dirty="0" smtClean="0"/>
+              <a:t>childChannel的实现类是NioSocketChannel因此unsafe的实现类是NioByteUnsafe </a:t>
+            </a:r>
+            <a:r>
+              <a:rPr lang="en-US" altLang="zh-CN" dirty="0" smtClean="0"/>
+              <a:t>/ parentChannel的实现类是NioServerSocketChannel因此unsafe的实现类是NioMessageUnsafe</a:t>
+            </a:r>
+            <a:endParaRPr lang="en-US" altLang="zh-CN" dirty="0" smtClean="0"/>
           </a:p>
         </p:txBody>
       </p:sp>
@@ -15046,7 +15155,7 @@
         </p:blipFill>
         <p:spPr>
           <a:xfrm>
-            <a:off x="1951355" y="4958080"/>
+            <a:off x="1951355" y="4453890"/>
             <a:ext cx="5362575" cy="855980"/>
           </a:xfrm>
           <a:prstGeom prst="rect">
@@ -15062,7 +15171,7 @@
         </p:nvSpPr>
         <p:spPr>
           <a:xfrm>
-            <a:off x="312420" y="5201920"/>
+            <a:off x="312420" y="4697730"/>
             <a:ext cx="1463040" cy="368300"/>
           </a:xfrm>
           <a:prstGeom prst="rect">
@@ -15677,7 +15786,7 @@
         <p:spPr>
           <a:xfrm>
             <a:off x="292100" y="1452245"/>
-            <a:ext cx="7192010" cy="2030095"/>
+            <a:ext cx="7192010" cy="2584450"/>
           </a:xfrm>
           <a:prstGeom prst="rect">
             <a:avLst/>
@@ -15841,14 +15950,94 @@
               <a:buFont typeface="Arial" panose="020B0604020202020204" pitchFamily="34" charset="0"/>
               <a:buChar char="•"/>
             </a:pPr>
-            <a:endParaRPr lang="zh-CN" altLang="en-US" dirty="0" smtClean="0"/>
+            <a:r>
+              <a:rPr lang="zh-CN" altLang="en-US" dirty="0" smtClean="0"/>
+              <a:t>注册：fireChannelRegistered方法 </a:t>
+            </a:r>
+            <a:r>
+              <a:rPr lang="en-US" altLang="zh-CN" dirty="0" smtClean="0"/>
+              <a:t>/ </a:t>
+            </a:r>
+            <a:r>
+              <a:rPr lang="zh-CN" altLang="en-US" dirty="0" smtClean="0"/>
+              <a:t>读取：fireChannelRead方法</a:t>
+            </a:r>
+            <a:r>
+              <a:rPr lang="en-US" altLang="zh-CN" dirty="0" smtClean="0"/>
+              <a:t>...</a:t>
+            </a:r>
+            <a:endParaRPr lang="en-US" altLang="zh-CN" dirty="0" smtClean="0"/>
           </a:p>
           <a:p>
             <a:pPr marL="285750" indent="-285750">
               <a:buFont typeface="Arial" panose="020B0604020202020204" pitchFamily="34" charset="0"/>
               <a:buChar char="•"/>
             </a:pPr>
-            <a:endParaRPr dirty="0" smtClean="0"/>
+            <a:r>
+              <a:rPr lang="en-US" altLang="zh-CN" dirty="0" smtClean="0"/>
+              <a:t>Inbound的操作</a:t>
+            </a:r>
+            <a:r>
+              <a:rPr lang="zh-CN" altLang="en-US" dirty="0" smtClean="0"/>
+              <a:t>，调用</a:t>
+            </a:r>
+            <a:r>
+              <a:rPr lang="en-US" altLang="zh-CN" dirty="0" smtClean="0"/>
+              <a:t>fire...</a:t>
+            </a:r>
+            <a:r>
+              <a:rPr lang="zh-CN" altLang="en-US" dirty="0" smtClean="0"/>
+              <a:t>方法传递 head</a:t>
+            </a:r>
+            <a:r>
+              <a:rPr lang="en-US" altLang="zh-CN" dirty="0" smtClean="0"/>
+              <a:t>-&gt;tail</a:t>
+            </a:r>
+            <a:endParaRPr lang="en-US" altLang="zh-CN" dirty="0" smtClean="0"/>
+          </a:p>
+          <a:p>
+            <a:pPr marL="285750" indent="-285750">
+              <a:buFont typeface="Arial" panose="020B0604020202020204" pitchFamily="34" charset="0"/>
+              <a:buChar char="•"/>
+            </a:pPr>
+            <a:r>
+              <a:rPr lang="en-US" altLang="zh-CN" dirty="0" smtClean="0">
+                <a:sym typeface="+mn-ea"/>
+              </a:rPr>
+              <a:t>Outbound的操作</a:t>
+            </a:r>
+            <a:r>
+              <a:rPr lang="zh-CN" altLang="en-US" dirty="0" smtClean="0">
+                <a:sym typeface="+mn-ea"/>
+              </a:rPr>
+              <a:t>，调用</a:t>
+            </a:r>
+            <a:r>
+              <a:rPr lang="en-US" altLang="zh-CN" dirty="0" smtClean="0">
+                <a:sym typeface="+mn-ea"/>
+              </a:rPr>
+              <a:t>fire...</a:t>
+            </a:r>
+            <a:r>
+              <a:rPr lang="zh-CN" altLang="en-US" dirty="0" smtClean="0">
+                <a:sym typeface="+mn-ea"/>
+              </a:rPr>
+              <a:t>方法传递 </a:t>
+            </a:r>
+            <a:r>
+              <a:rPr lang="en-US" altLang="zh-CN" dirty="0" smtClean="0">
+                <a:sym typeface="+mn-ea"/>
+              </a:rPr>
+              <a:t>tail-&gt;head</a:t>
+            </a:r>
+            <a:endParaRPr lang="en-US" altLang="zh-CN" dirty="0" smtClean="0"/>
+          </a:p>
+          <a:p>
+            <a:pPr marL="285750" indent="-285750">
+              <a:buFont typeface="Arial" panose="020B0604020202020204" pitchFamily="34" charset="0"/>
+              <a:buChar char="•"/>
+            </a:pPr>
+            <a:endParaRPr lang="en-US" altLang="zh-CN" dirty="0" smtClean="0"/>
           </a:p>
         </p:txBody>
       </p:sp>
@@ -16452,34 +16641,23 @@
           <a:lstStyle/>
           <a:p>
             <a:r>
-              <a:rPr lang="zh-CN" altLang="en-US" sz="2000" dirty="0"/>
-              <a:t>异步处理（ </a:t>
-            </a:r>
-            <a:r>
-              <a:rPr lang="en-US" altLang="zh-CN" sz="2000" dirty="0" err="1"/>
-              <a:t>ChannelFuture</a:t>
-            </a:r>
-            <a:r>
-              <a:rPr lang="en-US" altLang="zh-CN" sz="2000" dirty="0"/>
-              <a:t> </a:t>
-            </a:r>
-            <a:r>
-              <a:rPr lang="zh-CN" altLang="en-US" sz="2000" dirty="0"/>
-              <a:t>、 </a:t>
-            </a:r>
-            <a:r>
-              <a:rPr lang="en-US" altLang="zh-CN" sz="2000" dirty="0" err="1"/>
-              <a:t>ChannelPromise</a:t>
-            </a:r>
-            <a:r>
-              <a:rPr lang="en-US" altLang="zh-CN" sz="2000" dirty="0"/>
-              <a:t> </a:t>
-            </a:r>
-            <a:r>
-              <a:rPr lang="zh-CN" altLang="en-US" sz="2000" dirty="0" smtClean="0"/>
-              <a:t>）</a:t>
-            </a:r>
-            <a:endParaRPr lang="zh-CN" altLang="en-US" sz="2000" dirty="0"/>
+              <a:rPr lang="en-US" altLang="zh-CN" sz="2000" dirty="0" smtClean="0">
+                <a:latin typeface="华文中宋" panose="02010600040101010101" pitchFamily="2" charset="-122"/>
+                <a:ea typeface="华文中宋" panose="02010600040101010101" pitchFamily="2" charset="-122"/>
+              </a:rPr>
+              <a:t>TCP</a:t>
+            </a:r>
+            <a:r>
+              <a:rPr lang="zh-CN" altLang="en-US" sz="2000" dirty="0" smtClean="0">
+                <a:latin typeface="华文中宋" panose="02010600040101010101" pitchFamily="2" charset="-122"/>
+                <a:ea typeface="华文中宋" panose="02010600040101010101" pitchFamily="2" charset="-122"/>
+              </a:rPr>
+              <a:t>粘包、拆包</a:t>
+            </a:r>
+            <a:endParaRPr lang="en-US" altLang="zh-CN" sz="2000" dirty="0">
+              <a:latin typeface="华文中宋" panose="02010600040101010101" pitchFamily="2" charset="-122"/>
+              <a:ea typeface="华文中宋" panose="02010600040101010101" pitchFamily="2" charset="-122"/>
+            </a:endParaRPr>
           </a:p>
         </p:txBody>
       </p:sp>
@@ -16505,190 +16683,65 @@
           </a:bodyPr>
           <a:lstStyle/>
           <a:p>
-            <a:pPr marL="285750" indent="-285750">
-              <a:buFont typeface="Arial" panose="020B0604020202020204" pitchFamily="34" charset="0"/>
-              <a:buChar char="•"/>
-            </a:pPr>
-            <a:r>
-              <a:rPr lang="en-US" altLang="zh-CN" dirty="0"/>
-              <a:t>Future</a:t>
-            </a:r>
-            <a:r>
-              <a:rPr lang="zh-CN" altLang="en-US" dirty="0"/>
-              <a:t>：</a:t>
-            </a:r>
-            <a:r>
-              <a:rPr lang="zh-CN" altLang="en-US" dirty="0" smtClean="0"/>
-              <a:t>在</a:t>
-            </a:r>
-            <a:r>
-              <a:rPr lang="en-US" altLang="zh-CN" dirty="0" err="1" smtClean="0"/>
-              <a:t>jdk</a:t>
-            </a:r>
-            <a:r>
-              <a:rPr lang="zh-CN" altLang="en-US" dirty="0" smtClean="0"/>
-              <a:t>的</a:t>
-            </a:r>
-            <a:r>
-              <a:rPr lang="en-US" altLang="zh-CN" dirty="0" smtClean="0"/>
-              <a:t>Future</a:t>
-            </a:r>
-            <a:r>
-              <a:rPr lang="zh-CN" altLang="en-US" dirty="0"/>
-              <a:t>的基础上拓展了监听器（</a:t>
-            </a:r>
-            <a:r>
-              <a:rPr lang="en-US" altLang="zh-CN" dirty="0"/>
-              <a:t>Listener</a:t>
-            </a:r>
-            <a:r>
-              <a:rPr lang="zh-CN" altLang="en-US" dirty="0"/>
-              <a:t>）</a:t>
-            </a:r>
-            <a:r>
-              <a:rPr lang="zh-CN" altLang="en-US" dirty="0" smtClean="0"/>
-              <a:t>接口</a:t>
-            </a:r>
-            <a:endParaRPr lang="en-US" altLang="zh-CN" dirty="0" smtClean="0"/>
-          </a:p>
-          <a:p>
-            <a:pPr marL="285750" indent="-285750">
-              <a:buFont typeface="Arial" panose="020B0604020202020204" pitchFamily="34" charset="0"/>
-              <a:buChar char="•"/>
-            </a:pPr>
-            <a:r>
-              <a:rPr lang="en-US" altLang="zh-CN" dirty="0" err="1"/>
-              <a:t>ChannelFuture</a:t>
-            </a:r>
-            <a:r>
-              <a:rPr lang="en-US" altLang="zh-CN" dirty="0"/>
-              <a:t> </a:t>
-            </a:r>
-            <a:r>
-              <a:rPr lang="zh-CN" altLang="en-US" dirty="0"/>
-              <a:t>：扩展了</a:t>
-            </a:r>
-            <a:r>
-              <a:rPr lang="en-US" altLang="zh-CN" dirty="0" err="1"/>
-              <a:t>Netty</a:t>
-            </a:r>
-            <a:r>
-              <a:rPr lang="zh-CN" altLang="en-US" dirty="0"/>
-              <a:t>的</a:t>
-            </a:r>
-            <a:r>
-              <a:rPr lang="en-US" altLang="zh-CN" dirty="0"/>
-              <a:t>Future</a:t>
-            </a:r>
-            <a:r>
-              <a:rPr lang="zh-CN" altLang="en-US" dirty="0"/>
-              <a:t>接口，表示一种没有返回值的异步调用，同时和一个</a:t>
-            </a:r>
-            <a:r>
-              <a:rPr lang="en-US" altLang="zh-CN" dirty="0"/>
-              <a:t>Channel</a:t>
-            </a:r>
-            <a:r>
-              <a:rPr lang="zh-CN" altLang="en-US" dirty="0"/>
-              <a:t>进行</a:t>
-            </a:r>
-            <a:r>
-              <a:rPr lang="zh-CN" altLang="en-US" dirty="0" smtClean="0"/>
-              <a:t>绑定</a:t>
-            </a:r>
-            <a:endParaRPr lang="en-US" altLang="zh-CN" dirty="0" smtClean="0"/>
-          </a:p>
-          <a:p>
-            <a:pPr marL="285750" indent="-285750">
-              <a:buFont typeface="Arial" panose="020B0604020202020204" pitchFamily="34" charset="0"/>
-              <a:buChar char="•"/>
-            </a:pPr>
-            <a:r>
-              <a:rPr lang="en-US" altLang="zh-CN" dirty="0" smtClean="0"/>
-              <a:t>Promise</a:t>
-            </a:r>
-            <a:r>
-              <a:rPr lang="zh-CN" altLang="en-US" dirty="0" smtClean="0"/>
-              <a:t>：</a:t>
-            </a:r>
-            <a:r>
-              <a:rPr lang="en-US" altLang="zh-CN" dirty="0" err="1" smtClean="0"/>
-              <a:t>Netty</a:t>
-            </a:r>
-            <a:r>
-              <a:rPr lang="zh-CN" altLang="en-US" dirty="0" smtClean="0"/>
-              <a:t>的</a:t>
-            </a:r>
-            <a:r>
-              <a:rPr lang="en-US" altLang="zh-CN" dirty="0" smtClean="0"/>
-              <a:t>Future</a:t>
-            </a:r>
-            <a:r>
-              <a:rPr lang="zh-CN" altLang="en-US" dirty="0"/>
-              <a:t>的扩展，表示一种可写的</a:t>
-            </a:r>
-            <a:r>
-              <a:rPr lang="en-US" altLang="zh-CN" dirty="0"/>
-              <a:t>Future</a:t>
-            </a:r>
-            <a:endParaRPr lang="en-US" altLang="zh-CN" dirty="0" smtClean="0"/>
-          </a:p>
-          <a:p>
-            <a:pPr marL="285750" indent="-285750">
-              <a:buFont typeface="Arial" panose="020B0604020202020204" pitchFamily="34" charset="0"/>
-              <a:buChar char="•"/>
-            </a:pPr>
-            <a:r>
-              <a:rPr lang="en-US" altLang="zh-CN" dirty="0" err="1" smtClean="0"/>
-              <a:t>ChannelPromise</a:t>
-            </a:r>
-            <a:r>
-              <a:rPr lang="en-US" altLang="zh-CN" dirty="0" smtClean="0"/>
-              <a:t> </a:t>
-            </a:r>
-            <a:r>
-              <a:rPr lang="zh-CN" altLang="en-US" dirty="0" smtClean="0"/>
-              <a:t>：</a:t>
-            </a:r>
-            <a:r>
-              <a:rPr lang="zh-CN" altLang="en-US" dirty="0"/>
-              <a:t>扩展了</a:t>
-            </a:r>
-            <a:r>
-              <a:rPr lang="en-US" altLang="zh-CN" dirty="0" err="1"/>
-              <a:t>Netty</a:t>
-            </a:r>
-            <a:r>
-              <a:rPr lang="zh-CN" altLang="en-US" dirty="0" smtClean="0"/>
-              <a:t>的</a:t>
-            </a:r>
-            <a:r>
-              <a:rPr lang="en-US" altLang="zh-CN" dirty="0"/>
-              <a:t>Promise</a:t>
-            </a:r>
-            <a:r>
-              <a:rPr lang="zh-CN" altLang="en-US" dirty="0" smtClean="0"/>
-              <a:t>接口，绑定</a:t>
-            </a:r>
-            <a:r>
-              <a:rPr lang="zh-CN" altLang="en-US" dirty="0"/>
-              <a:t>了</a:t>
-            </a:r>
-            <a:r>
-              <a:rPr lang="en-US" altLang="zh-CN" dirty="0"/>
-              <a:t>Channel</a:t>
-            </a:r>
-            <a:r>
-              <a:rPr lang="zh-CN" altLang="en-US" dirty="0"/>
-              <a:t>，既可以写异步执行结果，</a:t>
-            </a:r>
-            <a:r>
-              <a:rPr lang="zh-CN" altLang="en-US" dirty="0" smtClean="0"/>
-              <a:t>又有监听</a:t>
-            </a:r>
-            <a:r>
-              <a:rPr lang="zh-CN" altLang="en-US" dirty="0"/>
-              <a:t>者的功能</a:t>
+            <a:r>
+              <a:rPr lang="en-US" altLang="zh-CN" dirty="0" smtClean="0">
+                <a:latin typeface="+mn-ea"/>
+              </a:rPr>
+              <a:t>    TCP</a:t>
+            </a:r>
+            <a:r>
+              <a:rPr lang="zh-CN" altLang="en-US" dirty="0">
+                <a:latin typeface="+mn-ea"/>
+              </a:rPr>
+              <a:t>是一个“流”协议。所谓流，就是没有界限的一长串二进制数据。</a:t>
+            </a:r>
+            <a:r>
+              <a:rPr lang="en-US" altLang="zh-CN" dirty="0">
+                <a:latin typeface="+mn-ea"/>
+              </a:rPr>
+              <a:t>TCP</a:t>
+            </a:r>
+            <a:r>
+              <a:rPr lang="zh-CN" altLang="en-US" dirty="0">
+                <a:latin typeface="+mn-ea"/>
+              </a:rPr>
+              <a:t>作为传输层协议，并不了解上层业务数据的具体含义，它会根据</a:t>
+            </a:r>
+            <a:r>
+              <a:rPr lang="en-US" altLang="zh-CN" dirty="0">
+                <a:latin typeface="+mn-ea"/>
+              </a:rPr>
+              <a:t>TCP</a:t>
+            </a:r>
+            <a:r>
+              <a:rPr lang="zh-CN" altLang="en-US" dirty="0">
+                <a:latin typeface="+mn-ea"/>
+              </a:rPr>
+              <a:t>缓冲区的实际情况进行数据包的划分，所以在业务上认为是一个完整包的，可能会被</a:t>
+            </a:r>
+            <a:r>
+              <a:rPr lang="en-US" altLang="zh-CN" dirty="0">
+                <a:latin typeface="+mn-ea"/>
+              </a:rPr>
+              <a:t>TCP</a:t>
+            </a:r>
+            <a:r>
+              <a:rPr lang="zh-CN" altLang="en-US" dirty="0">
+                <a:latin typeface="+mn-ea"/>
+              </a:rPr>
+              <a:t>拆分成多个包进行发送，也有可能把多个小的包封装成一个大的数据包发送，这就是所谓的</a:t>
+            </a:r>
+            <a:r>
+              <a:rPr lang="en-US" altLang="zh-CN" dirty="0">
+                <a:latin typeface="+mn-ea"/>
+              </a:rPr>
+              <a:t>TCP</a:t>
+            </a:r>
+            <a:r>
+              <a:rPr lang="zh-CN" altLang="en-US" dirty="0">
+                <a:latin typeface="+mn-ea"/>
+              </a:rPr>
+              <a:t>拆包和粘包问题。</a:t>
             </a:r>
             <a:endParaRPr lang="en-US" altLang="zh-CN" dirty="0">
               <a:latin typeface="+mn-ea"/>
@@ -16696,6 +16749,36 @@
           </a:p>
         </p:txBody>
       </p:sp>
+      <p:pic>
+        <p:nvPicPr>
+          <p:cNvPr id="2" name="图片 1"/>
+          <p:cNvPicPr>
+            <a:picLocks noChangeAspect="1"/>
+          </p:cNvPicPr>
+          <p:nvPr/>
+        </p:nvPicPr>
+        <p:blipFill>
+          <a:blip r:embed="rId1">
+            <a:extLst>
+              <a:ext uri="{28A0092B-C50C-407E-A947-70E740481C1C}">
+                <a14:useLocalDpi xmlns:a14="http://schemas.microsoft.com/office/drawing/2010/main" val="0"/>
+              </a:ext>
+            </a:extLst>
+          </a:blip>
+          <a:stretch>
+            <a:fillRect/>
+          </a:stretch>
+        </p:blipFill>
+        <p:spPr>
+          <a:xfrm>
+            <a:off x="1994715" y="2834987"/>
+            <a:ext cx="8003615" cy="3357994"/>
+          </a:xfrm>
+          <a:prstGeom prst="rect">
+            <a:avLst/>
+          </a:prstGeom>
+        </p:spPr>
+      </p:pic>
     </p:spTree>
   </p:cSld>
   <p:clrMapOvr>
@@ -17272,23 +17355,34 @@
           <a:lstStyle/>
           <a:p>
             <a:r>
-              <a:rPr lang="en-US" altLang="zh-CN" sz="2000" dirty="0" smtClean="0">
-                <a:latin typeface="华文中宋" panose="02010600040101010101" pitchFamily="2" charset="-122"/>
-                <a:ea typeface="华文中宋" panose="02010600040101010101" pitchFamily="2" charset="-122"/>
-              </a:rPr>
-              <a:t>TCP</a:t>
-            </a:r>
-            <a:r>
-              <a:rPr lang="zh-CN" altLang="en-US" sz="2000" dirty="0" smtClean="0">
-                <a:latin typeface="华文中宋" panose="02010600040101010101" pitchFamily="2" charset="-122"/>
-                <a:ea typeface="华文中宋" panose="02010600040101010101" pitchFamily="2" charset="-122"/>
-              </a:rPr>
-              <a:t>粘包、拆包</a:t>
-            </a:r>
-            <a:endParaRPr lang="en-US" altLang="zh-CN" sz="2000" dirty="0">
-              <a:latin typeface="华文中宋" panose="02010600040101010101" pitchFamily="2" charset="-122"/>
-              <a:ea typeface="华文中宋" panose="02010600040101010101" pitchFamily="2" charset="-122"/>
-            </a:endParaRPr>
+              <a:rPr lang="zh-CN" altLang="en-US" sz="2000" dirty="0"/>
+              <a:t>异步处理（ </a:t>
+            </a:r>
+            <a:r>
+              <a:rPr lang="en-US" altLang="zh-CN" sz="2000" dirty="0" err="1"/>
+              <a:t>ChannelFuture</a:t>
+            </a:r>
+            <a:r>
+              <a:rPr lang="en-US" altLang="zh-CN" sz="2000" dirty="0"/>
+              <a:t> </a:t>
+            </a:r>
+            <a:r>
+              <a:rPr lang="zh-CN" altLang="en-US" sz="2000" dirty="0"/>
+              <a:t>、 </a:t>
+            </a:r>
+            <a:r>
+              <a:rPr lang="en-US" altLang="zh-CN" sz="2000" dirty="0" err="1"/>
+              <a:t>ChannelPromise</a:t>
+            </a:r>
+            <a:r>
+              <a:rPr lang="en-US" altLang="zh-CN" sz="2000" dirty="0"/>
+              <a:t> </a:t>
+            </a:r>
+            <a:r>
+              <a:rPr lang="zh-CN" altLang="en-US" sz="2000" dirty="0" smtClean="0"/>
+              <a:t>）</a:t>
+            </a:r>
+            <a:endParaRPr lang="zh-CN" altLang="en-US" sz="2000" dirty="0"/>
           </a:p>
         </p:txBody>
       </p:sp>
@@ -17301,7 +17395,7 @@
         <p:spPr>
           <a:xfrm>
             <a:off x="292340" y="1452424"/>
-            <a:ext cx="11408367" cy="1200329"/>
+            <a:ext cx="11408367" cy="2861310"/>
           </a:xfrm>
           <a:prstGeom prst="rect">
             <a:avLst/>
@@ -17314,102 +17408,410 @@
           </a:bodyPr>
           <a:lstStyle/>
           <a:p>
+            <a:pPr marL="285750" indent="-285750">
+              <a:buFont typeface="Arial" panose="020B0604020202020204" pitchFamily="34" charset="0"/>
+              <a:buChar char="•"/>
+            </a:pPr>
+            <a:r>
+              <a:rPr lang="zh-CN" altLang="en-US" dirty="0"/>
+              <a:t>在</a:t>
+            </a:r>
+            <a:r>
+              <a:rPr lang="en-US" altLang="zh-CN" dirty="0"/>
+              <a:t>Netty</a:t>
+            </a:r>
+            <a:r>
+              <a:rPr lang="zh-CN" altLang="en-US" dirty="0"/>
+              <a:t>中，所有的</a:t>
+            </a:r>
+            <a:r>
+              <a:rPr lang="en-US" altLang="zh-CN" dirty="0"/>
+              <a:t>IO</a:t>
+            </a:r>
+            <a:r>
+              <a:rPr lang="zh-CN" altLang="en-US" dirty="0"/>
+              <a:t>操作都是一部执行的</a:t>
+            </a:r>
+            <a:endParaRPr lang="en-US" altLang="zh-CN" dirty="0"/>
+          </a:p>
+          <a:p>
+            <a:pPr marL="285750" indent="-285750">
+              <a:buFont typeface="Arial" panose="020B0604020202020204" pitchFamily="34" charset="0"/>
+              <a:buChar char="•"/>
+            </a:pPr>
+            <a:r>
+              <a:rPr lang="en-US" altLang="zh-CN" dirty="0"/>
+              <a:t>Future</a:t>
+            </a:r>
+            <a:r>
+              <a:rPr lang="zh-CN" altLang="en-US" dirty="0"/>
+              <a:t>：</a:t>
+            </a:r>
+            <a:r>
+              <a:rPr lang="zh-CN" altLang="en-US" dirty="0" smtClean="0"/>
+              <a:t>在</a:t>
+            </a:r>
+            <a:r>
+              <a:rPr lang="en-US" altLang="zh-CN" dirty="0" err="1" smtClean="0"/>
+              <a:t>jdk</a:t>
+            </a:r>
+            <a:r>
+              <a:rPr lang="zh-CN" altLang="en-US" dirty="0" smtClean="0"/>
+              <a:t>的</a:t>
+            </a:r>
+            <a:r>
+              <a:rPr lang="en-US" altLang="zh-CN" dirty="0" smtClean="0"/>
+              <a:t>Future</a:t>
+            </a:r>
+            <a:r>
+              <a:rPr lang="zh-CN" altLang="en-US" dirty="0"/>
+              <a:t>的基础上拓展了监听器（</a:t>
+            </a:r>
+            <a:r>
+              <a:rPr lang="en-US" altLang="zh-CN" dirty="0"/>
+              <a:t>Listener</a:t>
+            </a:r>
+            <a:r>
+              <a:rPr lang="zh-CN" altLang="en-US" dirty="0"/>
+              <a:t>）</a:t>
+            </a:r>
+            <a:r>
+              <a:rPr lang="zh-CN" altLang="en-US" dirty="0" smtClean="0"/>
+              <a:t>接口</a:t>
+            </a:r>
+            <a:endParaRPr lang="en-US" altLang="zh-CN" dirty="0" smtClean="0"/>
+          </a:p>
+          <a:p>
+            <a:pPr marL="285750" indent="-285750">
+              <a:buFont typeface="Arial" panose="020B0604020202020204" pitchFamily="34" charset="0"/>
+              <a:buChar char="•"/>
+            </a:pPr>
+            <a:r>
+              <a:rPr lang="en-US" altLang="zh-CN" dirty="0" err="1"/>
+              <a:t>ChannelFuture</a:t>
+            </a:r>
+            <a:r>
+              <a:rPr lang="en-US" altLang="zh-CN" dirty="0"/>
+              <a:t> </a:t>
+            </a:r>
+            <a:r>
+              <a:rPr lang="zh-CN" altLang="en-US" dirty="0"/>
+              <a:t>：扩展了</a:t>
+            </a:r>
+            <a:r>
+              <a:rPr lang="en-US" altLang="zh-CN" dirty="0" err="1"/>
+              <a:t>Netty</a:t>
+            </a:r>
+            <a:r>
+              <a:rPr lang="zh-CN" altLang="en-US" dirty="0"/>
+              <a:t>的</a:t>
+            </a:r>
+            <a:r>
+              <a:rPr lang="en-US" altLang="zh-CN" dirty="0"/>
+              <a:t>Future</a:t>
+            </a:r>
+            <a:r>
+              <a:rPr lang="zh-CN" altLang="en-US" dirty="0"/>
+              <a:t>接口，表示一种没有返回值的异步调用，同时和一个</a:t>
+            </a:r>
+            <a:r>
+              <a:rPr lang="en-US" altLang="zh-CN" dirty="0"/>
+              <a:t>Channel</a:t>
+            </a:r>
+            <a:r>
+              <a:rPr lang="zh-CN" altLang="en-US" dirty="0"/>
+              <a:t>进行</a:t>
+            </a:r>
+            <a:r>
+              <a:rPr lang="zh-CN" altLang="en-US" dirty="0" smtClean="0"/>
+              <a:t>绑定</a:t>
+            </a:r>
+            <a:endParaRPr lang="en-US" altLang="zh-CN" dirty="0" smtClean="0"/>
+          </a:p>
+          <a:p>
+            <a:pPr marL="285750" indent="-285750">
+              <a:buFont typeface="Arial" panose="020B0604020202020204" pitchFamily="34" charset="0"/>
+              <a:buChar char="•"/>
+            </a:pPr>
+            <a:r>
+              <a:rPr lang="en-US" altLang="zh-CN" dirty="0" smtClean="0"/>
+              <a:t>Promise</a:t>
+            </a:r>
+            <a:r>
+              <a:rPr lang="zh-CN" altLang="en-US" dirty="0" smtClean="0"/>
+              <a:t>：</a:t>
+            </a:r>
+            <a:r>
+              <a:rPr lang="en-US" altLang="zh-CN" dirty="0" err="1" smtClean="0"/>
+              <a:t>Netty</a:t>
+            </a:r>
+            <a:r>
+              <a:rPr lang="zh-CN" altLang="en-US" dirty="0" smtClean="0"/>
+              <a:t>的</a:t>
+            </a:r>
+            <a:r>
+              <a:rPr lang="en-US" altLang="zh-CN" dirty="0" smtClean="0"/>
+              <a:t>Future</a:t>
+            </a:r>
+            <a:r>
+              <a:rPr lang="zh-CN" altLang="en-US" dirty="0"/>
+              <a:t>的扩展，表示一种可写的</a:t>
+            </a:r>
+            <a:r>
+              <a:rPr lang="en-US" altLang="zh-CN" dirty="0"/>
+              <a:t>Future</a:t>
+            </a:r>
+            <a:endParaRPr lang="en-US" altLang="zh-CN" dirty="0" smtClean="0"/>
+          </a:p>
+          <a:p>
+            <a:pPr marL="285750" indent="-285750">
+              <a:buFont typeface="Arial" panose="020B0604020202020204" pitchFamily="34" charset="0"/>
+              <a:buChar char="•"/>
+            </a:pPr>
+            <a:r>
+              <a:rPr lang="en-US" altLang="zh-CN" dirty="0" err="1" smtClean="0"/>
+              <a:t>ChannelPromise</a:t>
+            </a:r>
+            <a:r>
+              <a:rPr lang="en-US" altLang="zh-CN" dirty="0" smtClean="0"/>
+              <a:t> </a:t>
+            </a:r>
+            <a:r>
+              <a:rPr lang="zh-CN" altLang="en-US" dirty="0" smtClean="0"/>
+              <a:t>：</a:t>
+            </a:r>
+            <a:r>
+              <a:rPr lang="zh-CN" altLang="en-US" dirty="0"/>
+              <a:t>扩展了</a:t>
+            </a:r>
+            <a:r>
+              <a:rPr lang="en-US" altLang="zh-CN" dirty="0" err="1"/>
+              <a:t>Netty</a:t>
+            </a:r>
+            <a:r>
+              <a:rPr lang="zh-CN" altLang="en-US" dirty="0" smtClean="0"/>
+              <a:t>的</a:t>
+            </a:r>
+            <a:r>
+              <a:rPr lang="en-US" altLang="zh-CN" dirty="0"/>
+              <a:t>Promise</a:t>
+            </a:r>
+            <a:r>
+              <a:rPr lang="zh-CN" altLang="en-US" dirty="0" smtClean="0"/>
+              <a:t>接口，绑定</a:t>
+            </a:r>
+            <a:r>
+              <a:rPr lang="zh-CN" altLang="en-US" dirty="0"/>
+              <a:t>了</a:t>
+            </a:r>
+            <a:r>
+              <a:rPr lang="en-US" altLang="zh-CN" dirty="0"/>
+              <a:t>Channel</a:t>
+            </a:r>
+            <a:r>
+              <a:rPr lang="zh-CN" altLang="en-US" dirty="0"/>
+              <a:t>，既可以写异步执行结果，</a:t>
+            </a:r>
+            <a:r>
+              <a:rPr lang="zh-CN" altLang="en-US" dirty="0" smtClean="0"/>
+              <a:t>又有监听</a:t>
+            </a:r>
+            <a:r>
+              <a:rPr lang="zh-CN" altLang="en-US" dirty="0"/>
+              <a:t>者的功能</a:t>
+            </a:r>
+            <a:endParaRPr lang="zh-CN" altLang="en-US" dirty="0"/>
+          </a:p>
+          <a:p>
+            <a:pPr marL="285750" indent="-285750">
+              <a:buFont typeface="Arial" panose="020B0604020202020204" pitchFamily="34" charset="0"/>
+              <a:buChar char="•"/>
+            </a:pPr>
+            <a:r>
+              <a:rPr lang="en-US" altLang="zh-CN" dirty="0"/>
+              <a:t>Channel</a:t>
+            </a:r>
+            <a:r>
+              <a:rPr lang="zh-CN" altLang="en-US" dirty="0"/>
+              <a:t>会持有</a:t>
+            </a:r>
+            <a:r>
+              <a:rPr lang="en-US" altLang="zh-CN" dirty="0" err="1">
+                <a:sym typeface="+mn-ea"/>
+              </a:rPr>
+              <a:t>ChannelFuture</a:t>
+            </a:r>
+            <a:r>
+              <a:rPr lang="zh-CN" altLang="en-US" dirty="0">
+                <a:sym typeface="+mn-ea"/>
+              </a:rPr>
+              <a:t>对象，</a:t>
+            </a:r>
+            <a:r>
+              <a:rPr lang="en-US" altLang="zh-CN" dirty="0">
+                <a:sym typeface="+mn-ea"/>
+              </a:rPr>
+              <a:t>listener</a:t>
+            </a:r>
+            <a:r>
+              <a:rPr lang="zh-CN" altLang="en-US" dirty="0">
+                <a:sym typeface="+mn-ea"/>
+              </a:rPr>
+              <a:t>通过</a:t>
+            </a:r>
+            <a:r>
+              <a:rPr lang="en-US" altLang="zh-CN" dirty="0">
+                <a:sym typeface="+mn-ea"/>
+              </a:rPr>
+              <a:t>add</a:t>
+            </a:r>
+            <a:r>
+              <a:rPr lang="en-US" altLang="zh-CN" dirty="0">
+                <a:sym typeface="+mn-ea"/>
+              </a:rPr>
+              <a:t>Listener</a:t>
+            </a:r>
+            <a:r>
+              <a:rPr lang="zh-CN" altLang="en-US" dirty="0">
+                <a:sym typeface="+mn-ea"/>
+              </a:rPr>
+              <a:t>方法加入</a:t>
+            </a:r>
+            <a:r>
+              <a:rPr lang="en-US" altLang="zh-CN" dirty="0">
+                <a:sym typeface="+mn-ea"/>
+              </a:rPr>
+              <a:t>listener</a:t>
+            </a:r>
+            <a:r>
+              <a:rPr lang="zh-CN" altLang="en-US" dirty="0">
+                <a:sym typeface="+mn-ea"/>
+              </a:rPr>
+              <a:t>数组，执行异步</a:t>
+            </a:r>
+            <a:r>
+              <a:rPr lang="en-US" altLang="zh-CN" dirty="0">
+                <a:sym typeface="+mn-ea"/>
+              </a:rPr>
+              <a:t>IO</a:t>
+            </a:r>
+            <a:r>
+              <a:rPr lang="zh-CN" altLang="en-US" dirty="0">
+                <a:sym typeface="+mn-ea"/>
+              </a:rPr>
+              <a:t>操作时通常会携带一个</a:t>
+            </a:r>
+            <a:r>
+              <a:rPr lang="en-US" altLang="zh-CN" dirty="0" err="1" smtClean="0">
+                <a:sym typeface="+mn-ea"/>
+              </a:rPr>
+              <a:t>ChannelPromise</a:t>
+            </a:r>
             <a:r>
               <a:rPr lang="en-US" altLang="zh-CN" dirty="0" smtClean="0">
-                <a:latin typeface="+mn-ea"/>
-              </a:rPr>
-              <a:t>    TCP</a:t>
+                <a:sym typeface="+mn-ea"/>
+              </a:rPr>
+              <a:t> </a:t>
+            </a:r>
+            <a:r>
+              <a:rPr lang="zh-CN" altLang="en-US" dirty="0" smtClean="0">
+                <a:sym typeface="+mn-ea"/>
+              </a:rPr>
+              <a:t>，与</a:t>
+            </a:r>
+            <a:r>
+              <a:rPr lang="en-US" altLang="zh-CN" dirty="0" smtClean="0">
+                <a:sym typeface="+mn-ea"/>
+              </a:rPr>
+              <a:t>Channel</a:t>
+            </a:r>
+            <a:r>
+              <a:rPr lang="zh-CN" altLang="en-US" dirty="0" smtClean="0">
+                <a:sym typeface="+mn-ea"/>
+              </a:rPr>
+              <a:t>绑定，之前</a:t>
             </a:r>
             <a:r>
               <a:rPr lang="zh-CN" altLang="en-US" dirty="0">
-                <a:latin typeface="+mn-ea"/>
-              </a:rPr>
-              <a:t>是一个“流”协议。所谓流，就是没有界限的一长串二进制数据。</a:t>
+                <a:sym typeface="+mn-ea"/>
+              </a:rPr>
+              <a:t>ChannelFutureListener实际注册到了DefaultChannelPromise。在异步</a:t>
             </a:r>
             <a:r>
               <a:rPr lang="en-US" altLang="zh-CN" dirty="0">
-                <a:latin typeface="+mn-ea"/>
-              </a:rPr>
-              <a:t>TCP</a:t>
+                <a:sym typeface="+mn-ea"/>
+              </a:rPr>
+              <a:t>task</a:t>
             </a:r>
             <a:r>
               <a:rPr lang="zh-CN" altLang="en-US" dirty="0">
-                <a:latin typeface="+mn-ea"/>
-              </a:rPr>
-              <a:t>作为传输层协议，并不了解上层业务数据的具体含义，它会根据</a:t>
-            </a:r>
-            <a:r>
-              <a:rPr lang="en-US" altLang="zh-CN" dirty="0">
-                <a:latin typeface="+mn-ea"/>
-              </a:rPr>
-              <a:t>TCP</a:t>
+                <a:sym typeface="+mn-ea"/>
+              </a:rPr>
+              <a:t>结束后，调用</a:t>
+            </a:r>
+            <a:r>
+              <a:rPr lang="en-US" altLang="zh-CN" dirty="0" err="1" smtClean="0">
+                <a:sym typeface="+mn-ea"/>
+              </a:rPr>
+              <a:t>ChannelPromise</a:t>
+            </a:r>
+            <a:r>
+              <a:rPr lang="en-US" altLang="zh-CN" dirty="0" smtClean="0">
+                <a:sym typeface="+mn-ea"/>
+              </a:rPr>
+              <a:t> </a:t>
+            </a:r>
+            <a:r>
+              <a:rPr lang="zh-CN" altLang="en-US" dirty="0" smtClean="0">
+                <a:sym typeface="+mn-ea"/>
+              </a:rPr>
+              <a:t>的</a:t>
+            </a:r>
+            <a:r>
+              <a:rPr lang="en-US" altLang="zh-CN" dirty="0" smtClean="0">
+                <a:sym typeface="+mn-ea"/>
+              </a:rPr>
+              <a:t>success</a:t>
+            </a:r>
+            <a:r>
+              <a:rPr lang="zh-CN" altLang="en-US" dirty="0" smtClean="0">
+                <a:sym typeface="+mn-ea"/>
+              </a:rPr>
+              <a:t>或者</a:t>
+            </a:r>
+            <a:r>
+              <a:rPr lang="en-US" altLang="zh-CN" dirty="0" smtClean="0">
+                <a:sym typeface="+mn-ea"/>
+              </a:rPr>
+              <a:t>failure</a:t>
+            </a:r>
+            <a:r>
+              <a:rPr lang="zh-CN" altLang="en-US" dirty="0" smtClean="0">
+                <a:sym typeface="+mn-ea"/>
+              </a:rPr>
+              <a:t>方法将结果回调，最后会调用</a:t>
             </a:r>
             <a:r>
               <a:rPr lang="zh-CN" altLang="en-US" dirty="0">
-                <a:latin typeface="+mn-ea"/>
-              </a:rPr>
-              <a:t>缓冲区的实际情况进行数据包的划分，所以在业务上认为是一个完整包的，可能会被</a:t>
-            </a:r>
-            <a:r>
-              <a:rPr lang="en-US" altLang="zh-CN" dirty="0">
-                <a:latin typeface="+mn-ea"/>
-              </a:rPr>
-              <a:t>TCP</a:t>
-            </a:r>
-            <a:r>
-              <a:rPr lang="zh-CN" altLang="en-US" dirty="0">
-                <a:latin typeface="+mn-ea"/>
-              </a:rPr>
-              <a:t>拆分成多个包进行发送，也有可能把多个小的包封装成一个大的数据包发送，这就是所谓的</a:t>
-            </a:r>
-            <a:r>
-              <a:rPr lang="en-US" altLang="zh-CN" dirty="0">
-                <a:latin typeface="+mn-ea"/>
-              </a:rPr>
-              <a:t>TCP</a:t>
-            </a:r>
-            <a:r>
-              <a:rPr lang="zh-CN" altLang="en-US" dirty="0">
-                <a:latin typeface="+mn-ea"/>
-              </a:rPr>
-              <a:t>拆包和粘包问题。</a:t>
-            </a:r>
+                <a:sym typeface="+mn-ea"/>
+              </a:rPr>
+              <a:t>notifyListeners方法来通知监听者</a:t>
+            </a:r>
+            <a:endParaRPr lang="zh-CN" altLang="en-US" dirty="0">
+              <a:sym typeface="+mn-ea"/>
+            </a:endParaRPr>
+          </a:p>
+          <a:p>
+            <a:pPr marL="285750" indent="-285750">
+              <a:buFont typeface="Arial" panose="020B0604020202020204" pitchFamily="34" charset="0"/>
+              <a:buChar char="•"/>
+            </a:pPr>
             <a:endParaRPr lang="en-US" altLang="zh-CN" dirty="0">
               <a:latin typeface="+mn-ea"/>
             </a:endParaRPr>
           </a:p>
         </p:txBody>
       </p:sp>
-      <p:pic>
-        <p:nvPicPr>
-          <p:cNvPr id="2" name="图片 1"/>
-          <p:cNvPicPr>
-            <a:picLocks noChangeAspect="1"/>
-          </p:cNvPicPr>
-          <p:nvPr/>
-        </p:nvPicPr>
-        <p:blipFill>
-          <a:blip r:embed="rId1">
-            <a:extLst>
-              <a:ext uri="{28A0092B-C50C-407E-A947-70E740481C1C}">
-                <a14:useLocalDpi xmlns:a14="http://schemas.microsoft.com/office/drawing/2010/main" val="0"/>
-              </a:ext>
-            </a:extLst>
-          </a:blip>
-          <a:stretch>
-            <a:fillRect/>
-          </a:stretch>
-        </p:blipFill>
-        <p:spPr>
-          <a:xfrm>
-            <a:off x="1994715" y="2834987"/>
-            <a:ext cx="8003615" cy="3357994"/>
-          </a:xfrm>
-          <a:prstGeom prst="rect">
-            <a:avLst/>
-          </a:prstGeom>
-        </p:spPr>
-      </p:pic>
     </p:spTree>
   </p:cSld>
   <p:clrMapOvr>

</xml_diff>